<commit_message>
Changes to Lab sample python files
</commit_message>
<xml_diff>
--- a/PythonLabPlots.pptx
+++ b/PythonLabPlots.pptx
@@ -6,11 +6,14 @@
   </p:sldMasterIdLst>
   <p:sldIdLst>
     <p:sldId id="280" r:id="rId2"/>
-    <p:sldId id="274" r:id="rId3"/>
-    <p:sldId id="275" r:id="rId4"/>
-    <p:sldId id="276" r:id="rId5"/>
-    <p:sldId id="277" r:id="rId6"/>
-    <p:sldId id="279" r:id="rId7"/>
+    <p:sldId id="283" r:id="rId3"/>
+    <p:sldId id="274" r:id="rId4"/>
+    <p:sldId id="275" r:id="rId5"/>
+    <p:sldId id="276" r:id="rId6"/>
+    <p:sldId id="277" r:id="rId7"/>
+    <p:sldId id="279" r:id="rId8"/>
+    <p:sldId id="281" r:id="rId9"/>
+    <p:sldId id="282" r:id="rId10"/>
   </p:sldIdLst>
   <p:sldSz cx="12192000" cy="6858000"/>
   <p:notesSz cx="6858000" cy="9144000"/>
@@ -248,7 +251,7 @@
           <a:p>
             <a:fld id="{2FB4730B-5D83-4DEE-A74C-D6644E055767}" type="datetimeFigureOut">
               <a:rPr lang="en-US" smtClean="0"/>
-              <a:t>9/5/2018</a:t>
+              <a:t>9/11/2018</a:t>
             </a:fld>
             <a:endParaRPr lang="en-US"/>
           </a:p>
@@ -418,7 +421,7 @@
           <a:p>
             <a:fld id="{2FB4730B-5D83-4DEE-A74C-D6644E055767}" type="datetimeFigureOut">
               <a:rPr lang="en-US" smtClean="0"/>
-              <a:t>9/5/2018</a:t>
+              <a:t>9/11/2018</a:t>
             </a:fld>
             <a:endParaRPr lang="en-US"/>
           </a:p>
@@ -598,7 +601,7 @@
           <a:p>
             <a:fld id="{2FB4730B-5D83-4DEE-A74C-D6644E055767}" type="datetimeFigureOut">
               <a:rPr lang="en-US" smtClean="0"/>
-              <a:t>9/5/2018</a:t>
+              <a:t>9/11/2018</a:t>
             </a:fld>
             <a:endParaRPr lang="en-US"/>
           </a:p>
@@ -768,7 +771,7 @@
           <a:p>
             <a:fld id="{2FB4730B-5D83-4DEE-A74C-D6644E055767}" type="datetimeFigureOut">
               <a:rPr lang="en-US" smtClean="0"/>
-              <a:t>9/5/2018</a:t>
+              <a:t>9/11/2018</a:t>
             </a:fld>
             <a:endParaRPr lang="en-US"/>
           </a:p>
@@ -1014,7 +1017,7 @@
           <a:p>
             <a:fld id="{2FB4730B-5D83-4DEE-A74C-D6644E055767}" type="datetimeFigureOut">
               <a:rPr lang="en-US" smtClean="0"/>
-              <a:t>9/5/2018</a:t>
+              <a:t>9/11/2018</a:t>
             </a:fld>
             <a:endParaRPr lang="en-US"/>
           </a:p>
@@ -1246,7 +1249,7 @@
           <a:p>
             <a:fld id="{2FB4730B-5D83-4DEE-A74C-D6644E055767}" type="datetimeFigureOut">
               <a:rPr lang="en-US" smtClean="0"/>
-              <a:t>9/5/2018</a:t>
+              <a:t>9/11/2018</a:t>
             </a:fld>
             <a:endParaRPr lang="en-US"/>
           </a:p>
@@ -1613,7 +1616,7 @@
           <a:p>
             <a:fld id="{2FB4730B-5D83-4DEE-A74C-D6644E055767}" type="datetimeFigureOut">
               <a:rPr lang="en-US" smtClean="0"/>
-              <a:t>9/5/2018</a:t>
+              <a:t>9/11/2018</a:t>
             </a:fld>
             <a:endParaRPr lang="en-US"/>
           </a:p>
@@ -1731,7 +1734,7 @@
           <a:p>
             <a:fld id="{2FB4730B-5D83-4DEE-A74C-D6644E055767}" type="datetimeFigureOut">
               <a:rPr lang="en-US" smtClean="0"/>
-              <a:t>9/5/2018</a:t>
+              <a:t>9/11/2018</a:t>
             </a:fld>
             <a:endParaRPr lang="en-US"/>
           </a:p>
@@ -1826,7 +1829,7 @@
           <a:p>
             <a:fld id="{2FB4730B-5D83-4DEE-A74C-D6644E055767}" type="datetimeFigureOut">
               <a:rPr lang="en-US" smtClean="0"/>
-              <a:t>9/5/2018</a:t>
+              <a:t>9/11/2018</a:t>
             </a:fld>
             <a:endParaRPr lang="en-US"/>
           </a:p>
@@ -2103,7 +2106,7 @@
           <a:p>
             <a:fld id="{2FB4730B-5D83-4DEE-A74C-D6644E055767}" type="datetimeFigureOut">
               <a:rPr lang="en-US" smtClean="0"/>
-              <a:t>9/5/2018</a:t>
+              <a:t>9/11/2018</a:t>
             </a:fld>
             <a:endParaRPr lang="en-US"/>
           </a:p>
@@ -2356,7 +2359,7 @@
           <a:p>
             <a:fld id="{2FB4730B-5D83-4DEE-A74C-D6644E055767}" type="datetimeFigureOut">
               <a:rPr lang="en-US" smtClean="0"/>
-              <a:t>9/5/2018</a:t>
+              <a:t>9/11/2018</a:t>
             </a:fld>
             <a:endParaRPr lang="en-US"/>
           </a:p>
@@ -2569,7 +2572,7 @@
           <a:p>
             <a:fld id="{2FB4730B-5D83-4DEE-A74C-D6644E055767}" type="datetimeFigureOut">
               <a:rPr lang="en-US" smtClean="0"/>
-              <a:t>9/5/2018</a:t>
+              <a:t>9/11/2018</a:t>
             </a:fld>
             <a:endParaRPr lang="en-US"/>
           </a:p>
@@ -2991,15 +2994,7 @@
           <a:p>
             <a:r>
               <a:rPr lang="en-US" dirty="0" smtClean="0"/>
-              <a:t>Local </a:t>
-            </a:r>
-            <a:r>
-              <a:rPr lang="en-US" dirty="0" err="1" smtClean="0"/>
-              <a:t>Git</a:t>
-            </a:r>
-            <a:r>
-              <a:rPr lang="en-US" dirty="0" smtClean="0"/>
-              <a:t> and Remote Repository</a:t>
+              <a:t>Python Lab – Code Download and Setup</a:t>
             </a:r>
             <a:endParaRPr lang="en-US" dirty="0"/>
           </a:p>
@@ -3017,8 +3012,8 @@
         </p:nvSpPr>
         <p:spPr>
           <a:xfrm>
-            <a:off x="602672" y="1311170"/>
-            <a:ext cx="10986656" cy="4819466"/>
+            <a:off x="602672" y="2031357"/>
+            <a:ext cx="6666229" cy="3206188"/>
           </a:xfrm>
         </p:spPr>
         <p:txBody>
@@ -3035,17 +3030,36 @@
               <a:buAutoNum type="arabicPeriod"/>
             </a:pPr>
             <a:r>
+              <a:rPr lang="en-US" sz="2400" dirty="0"/>
+              <a:t>In your browser, open </a:t>
+            </a:r>
+            <a:r>
+              <a:rPr lang="en-US" sz="2400" dirty="0">
+                <a:hlinkClick r:id="rId2"/>
+              </a:rPr>
+              <a:t>https://</a:t>
+            </a:r>
+            <a:r>
+              <a:rPr lang="en-US" sz="2400" dirty="0" smtClean="0">
+                <a:hlinkClick r:id="rId2"/>
+              </a:rPr>
+              <a:t>github.com/EmoryPython/Lab</a:t>
+            </a:r>
+            <a:endParaRPr lang="en-US" sz="2400" dirty="0" smtClean="0"/>
+          </a:p>
+          <a:p>
+            <a:pPr marL="457200" indent="-457200">
+              <a:lnSpc>
+                <a:spcPct val="120000"/>
+              </a:lnSpc>
+              <a:buFont typeface="+mj-lt"/>
+              <a:buAutoNum type="arabicPeriod"/>
+            </a:pPr>
+            <a:r>
               <a:rPr lang="en-US" sz="2400" dirty="0" smtClean="0"/>
-              <a:t>On Windows </a:t>
-            </a:r>
-            <a:r>
-              <a:rPr lang="en-US" sz="2400" dirty="0" err="1" smtClean="0"/>
-              <a:t>cmd</a:t>
-            </a:r>
-            <a:r>
-              <a:rPr lang="en-US" sz="2400" dirty="0" smtClean="0"/>
-              <a:t>, change directories to the folder where the Python Lab code will be downloaded</a:t>
-            </a:r>
+              <a:t>Click on the green ‘Clone or Download’ button and ‘Download ZIP’:</a:t>
+            </a:r>
+            <a:endParaRPr lang="en-US" sz="2400" dirty="0" smtClean="0"/>
           </a:p>
           <a:p>
             <a:pPr marL="457200" indent="-457200">
@@ -3062,8 +3076,47 @@
             </a:r>
             <a:r>
               <a:rPr lang="en-US" sz="2400" dirty="0" smtClean="0"/>
-              <a:t>’ and cd into the directory</a:t>
-            </a:r>
+              <a:t>’ </a:t>
+            </a:r>
+            <a:r>
+              <a:rPr lang="en-US" sz="2400" dirty="0" smtClean="0"/>
+              <a:t>and extract the downloaded files into this directory</a:t>
+            </a:r>
+          </a:p>
+          <a:p>
+            <a:pPr marL="457200" indent="-457200">
+              <a:buFont typeface="+mj-lt"/>
+              <a:buAutoNum type="arabicPeriod"/>
+            </a:pPr>
+            <a:r>
+              <a:rPr lang="en-US" sz="2400" dirty="0" smtClean="0"/>
+              <a:t>On </a:t>
+            </a:r>
+            <a:r>
+              <a:rPr lang="en-US" sz="2400" dirty="0" err="1" smtClean="0"/>
+              <a:t>Git</a:t>
+            </a:r>
+            <a:r>
+              <a:rPr lang="en-US" sz="2400" dirty="0" smtClean="0"/>
+              <a:t>, create your repository if you don’t already have one</a:t>
+            </a:r>
+            <a:r>
+              <a:rPr lang="en-US" sz="2400" dirty="0"/>
+              <a:t>: </a:t>
+            </a:r>
+            <a:r>
+              <a:rPr lang="en-US" sz="2400" dirty="0">
+                <a:hlinkClick r:id="rId3"/>
+              </a:rPr>
+              <a:t>https://github.com</a:t>
+            </a:r>
+            <a:r>
+              <a:rPr lang="en-US" sz="2400" dirty="0" smtClean="0">
+                <a:hlinkClick r:id="rId3"/>
+              </a:rPr>
+              <a:t>/</a:t>
+            </a:r>
+            <a:endParaRPr lang="en-US" sz="2400" dirty="0" smtClean="0"/>
           </a:p>
           <a:p>
             <a:pPr marL="457200" indent="-457200">
@@ -3084,260 +3137,6 @@
               <a:buFont typeface="+mj-lt"/>
               <a:buAutoNum type="arabicPeriod"/>
             </a:pPr>
-            <a:r>
-              <a:rPr lang="en-US" sz="2400" dirty="0" smtClean="0"/>
-              <a:t>Type </a:t>
-            </a:r>
-            <a:r>
-              <a:rPr lang="en-US" sz="2400" b="1" dirty="0" err="1" smtClean="0">
-                <a:solidFill>
-                  <a:srgbClr val="FF0000"/>
-                </a:solidFill>
-              </a:rPr>
-              <a:t>git</a:t>
-            </a:r>
-            <a:r>
-              <a:rPr lang="en-US" sz="2400" b="1" dirty="0" smtClean="0">
-                <a:solidFill>
-                  <a:srgbClr val="FF0000"/>
-                </a:solidFill>
-              </a:rPr>
-              <a:t> </a:t>
-            </a:r>
-            <a:r>
-              <a:rPr lang="en-US" sz="2400" b="1" dirty="0" err="1" smtClean="0">
-                <a:solidFill>
-                  <a:srgbClr val="FF0000"/>
-                </a:solidFill>
-              </a:rPr>
-              <a:t>init</a:t>
-            </a:r>
-            <a:r>
-              <a:rPr lang="en-US" sz="2400" dirty="0" smtClean="0">
-                <a:solidFill>
-                  <a:srgbClr val="FF0000"/>
-                </a:solidFill>
-              </a:rPr>
-              <a:t> </a:t>
-            </a:r>
-            <a:r>
-              <a:rPr lang="en-US" sz="2400" dirty="0" smtClean="0"/>
-              <a:t>to create local </a:t>
-            </a:r>
-            <a:r>
-              <a:rPr lang="en-US" sz="2400" dirty="0" err="1" smtClean="0"/>
-              <a:t>git</a:t>
-            </a:r>
-            <a:r>
-              <a:rPr lang="en-US" sz="2400" dirty="0" smtClean="0"/>
-              <a:t> repo</a:t>
-            </a:r>
-          </a:p>
-          <a:p>
-            <a:pPr marL="457200" indent="-457200">
-              <a:buFont typeface="+mj-lt"/>
-              <a:buAutoNum type="arabicPeriod"/>
-            </a:pPr>
-            <a:r>
-              <a:rPr lang="en-US" sz="2400" dirty="0" smtClean="0"/>
-              <a:t>Type </a:t>
-            </a:r>
-            <a:r>
-              <a:rPr lang="en-US" sz="2400" b="1" dirty="0" err="1" smtClean="0">
-                <a:solidFill>
-                  <a:srgbClr val="FF0000"/>
-                </a:solidFill>
-              </a:rPr>
-              <a:t>git</a:t>
-            </a:r>
-            <a:r>
-              <a:rPr lang="en-US" sz="2400" b="1" dirty="0" smtClean="0">
-                <a:solidFill>
-                  <a:srgbClr val="FF0000"/>
-                </a:solidFill>
-              </a:rPr>
-              <a:t> remote add origin &lt;your </a:t>
-            </a:r>
-            <a:r>
-              <a:rPr lang="en-US" sz="2400" b="1" dirty="0" err="1" smtClean="0">
-                <a:solidFill>
-                  <a:srgbClr val="FF0000"/>
-                </a:solidFill>
-              </a:rPr>
-              <a:t>github</a:t>
-            </a:r>
-            <a:r>
-              <a:rPr lang="en-US" sz="2400" b="1" dirty="0" smtClean="0">
-                <a:solidFill>
-                  <a:srgbClr val="FF0000"/>
-                </a:solidFill>
-              </a:rPr>
-              <a:t> repo </a:t>
-            </a:r>
-            <a:r>
-              <a:rPr lang="en-US" sz="2400" b="1" dirty="0" err="1" smtClean="0">
-                <a:solidFill>
-                  <a:srgbClr val="FF0000"/>
-                </a:solidFill>
-              </a:rPr>
-              <a:t>url</a:t>
-            </a:r>
-            <a:r>
-              <a:rPr lang="en-US" sz="2400" b="1" dirty="0" smtClean="0">
-                <a:solidFill>
-                  <a:srgbClr val="FF0000"/>
-                </a:solidFill>
-              </a:rPr>
-              <a:t>&gt;</a:t>
-            </a:r>
-          </a:p>
-          <a:p>
-            <a:pPr marL="457200" indent="-457200">
-              <a:buFont typeface="+mj-lt"/>
-              <a:buAutoNum type="arabicPeriod"/>
-            </a:pPr>
-            <a:r>
-              <a:rPr lang="en-US" sz="2400" dirty="0" smtClean="0"/>
-              <a:t>Type </a:t>
-            </a:r>
-            <a:r>
-              <a:rPr lang="en-US" sz="2400" b="1" dirty="0" err="1" smtClean="0">
-                <a:solidFill>
-                  <a:srgbClr val="FF0000"/>
-                </a:solidFill>
-              </a:rPr>
-              <a:t>git</a:t>
-            </a:r>
-            <a:r>
-              <a:rPr lang="en-US" sz="2400" b="1" dirty="0" smtClean="0">
-                <a:solidFill>
-                  <a:srgbClr val="FF0000"/>
-                </a:solidFill>
-              </a:rPr>
-              <a:t> pull origin master</a:t>
-            </a:r>
-          </a:p>
-          <a:p>
-            <a:pPr marL="457200" indent="-457200">
-              <a:buFont typeface="+mj-lt"/>
-              <a:buAutoNum type="arabicPeriod"/>
-            </a:pPr>
-            <a:r>
-              <a:rPr lang="en-US" sz="2400" dirty="0" smtClean="0"/>
-              <a:t>Type </a:t>
-            </a:r>
-            <a:r>
-              <a:rPr lang="en-US" sz="2400" b="1" dirty="0" err="1" smtClean="0">
-                <a:solidFill>
-                  <a:srgbClr val="FF0000"/>
-                </a:solidFill>
-              </a:rPr>
-              <a:t>git</a:t>
-            </a:r>
-            <a:r>
-              <a:rPr lang="en-US" sz="2400" b="1" dirty="0" smtClean="0">
-                <a:solidFill>
-                  <a:srgbClr val="FF0000"/>
-                </a:solidFill>
-              </a:rPr>
-              <a:t> add . </a:t>
-            </a:r>
-            <a:r>
-              <a:rPr lang="en-US" sz="2400" dirty="0" smtClean="0"/>
-              <a:t>to add all files in the current directory to the local repo</a:t>
-            </a:r>
-          </a:p>
-          <a:p>
-            <a:pPr marL="457200" indent="-457200">
-              <a:buFont typeface="+mj-lt"/>
-              <a:buAutoNum type="arabicPeriod"/>
-            </a:pPr>
-            <a:r>
-              <a:rPr lang="en-US" sz="2400" dirty="0" smtClean="0"/>
-              <a:t>Type </a:t>
-            </a:r>
-            <a:r>
-              <a:rPr lang="en-US" sz="2400" b="1" dirty="0" err="1" smtClean="0">
-                <a:solidFill>
-                  <a:srgbClr val="FF0000"/>
-                </a:solidFill>
-              </a:rPr>
-              <a:t>git</a:t>
-            </a:r>
-            <a:r>
-              <a:rPr lang="en-US" sz="2400" b="1" dirty="0" smtClean="0">
-                <a:solidFill>
-                  <a:srgbClr val="FF0000"/>
-                </a:solidFill>
-              </a:rPr>
-              <a:t> commit </a:t>
-            </a:r>
-            <a:r>
-              <a:rPr lang="en-US" sz="2400" dirty="0" smtClean="0"/>
-              <a:t>and enter a commit message</a:t>
-            </a:r>
-          </a:p>
-          <a:p>
-            <a:pPr marL="457200" indent="-457200">
-              <a:buFont typeface="+mj-lt"/>
-              <a:buAutoNum type="arabicPeriod"/>
-            </a:pPr>
-            <a:r>
-              <a:rPr lang="en-US" sz="2400" dirty="0" smtClean="0"/>
-              <a:t>Type </a:t>
-            </a:r>
-            <a:r>
-              <a:rPr lang="en-US" sz="2400" b="1" dirty="0" err="1" smtClean="0">
-                <a:solidFill>
-                  <a:srgbClr val="FF0000"/>
-                </a:solidFill>
-              </a:rPr>
-              <a:t>git</a:t>
-            </a:r>
-            <a:r>
-              <a:rPr lang="en-US" sz="2400" b="1" dirty="0" smtClean="0">
-                <a:solidFill>
-                  <a:srgbClr val="FF0000"/>
-                </a:solidFill>
-              </a:rPr>
-              <a:t> push –u origin master </a:t>
-            </a:r>
-            <a:r>
-              <a:rPr lang="en-US" sz="2400" dirty="0" smtClean="0"/>
-              <a:t>to push your files to your </a:t>
-            </a:r>
-            <a:r>
-              <a:rPr lang="en-US" sz="2400" dirty="0" err="1" smtClean="0"/>
-              <a:t>Github</a:t>
-            </a:r>
-            <a:r>
-              <a:rPr lang="en-US" sz="2400" dirty="0" smtClean="0"/>
-              <a:t> remote repo</a:t>
-            </a:r>
-          </a:p>
-          <a:p>
-            <a:pPr marL="457200" indent="-457200">
-              <a:buFont typeface="+mj-lt"/>
-              <a:buAutoNum type="arabicPeriod"/>
-            </a:pPr>
-            <a:r>
-              <a:rPr lang="en-US" sz="2400" dirty="0" smtClean="0"/>
-              <a:t>Any changes to files in this folder can be pushed to the remote repo by repeating steps </a:t>
-            </a:r>
-            <a:r>
-              <a:rPr lang="en-US" sz="2400" b="1" dirty="0" smtClean="0">
-                <a:solidFill>
-                  <a:srgbClr val="FF0000"/>
-                </a:solidFill>
-              </a:rPr>
-              <a:t>6-8</a:t>
-            </a:r>
-          </a:p>
-          <a:p>
-            <a:pPr marL="457200" indent="-457200">
-              <a:buFont typeface="+mj-lt"/>
-              <a:buAutoNum type="arabicPeriod"/>
-            </a:pPr>
             <a:endParaRPr lang="en-US" sz="2400" dirty="0" smtClean="0"/>
           </a:p>
           <a:p>
@@ -3347,46 +3146,21 @@
       </p:sp>
       <p:pic>
         <p:nvPicPr>
-          <p:cNvPr id="4" name="Picture 3"/>
+          <p:cNvPr id="6" name="Picture 5"/>
           <p:cNvPicPr>
             <a:picLocks noChangeAspect="1"/>
           </p:cNvPicPr>
           <p:nvPr/>
         </p:nvPicPr>
-        <p:blipFill>
-          <a:blip r:embed="rId2"/>
-          <a:stretch>
-            <a:fillRect/>
-          </a:stretch>
+        <p:blipFill rotWithShape="1">
+          <a:blip r:embed="rId4"/>
+          <a:srcRect l="56096"/>
+          <a:stretch/>
         </p:blipFill>
         <p:spPr>
           <a:xfrm>
-            <a:off x="1186783" y="2478056"/>
-            <a:ext cx="6192544" cy="383125"/>
-          </a:xfrm>
-          <a:prstGeom prst="rect">
-            <a:avLst/>
-          </a:prstGeom>
-        </p:spPr>
-      </p:pic>
-      <p:pic>
-        <p:nvPicPr>
-          <p:cNvPr id="5" name="Picture 4"/>
-          <p:cNvPicPr>
-            <a:picLocks noChangeAspect="1"/>
-          </p:cNvPicPr>
-          <p:nvPr/>
-        </p:nvPicPr>
-        <p:blipFill>
-          <a:blip r:embed="rId3"/>
-          <a:stretch>
-            <a:fillRect/>
-          </a:stretch>
-        </p:blipFill>
-        <p:spPr>
-          <a:xfrm>
-            <a:off x="1186783" y="2861181"/>
-            <a:ext cx="6127348" cy="376167"/>
+            <a:off x="7221639" y="2031357"/>
+            <a:ext cx="4756230" cy="2979692"/>
           </a:xfrm>
           <a:prstGeom prst="rect">
             <a:avLst/>
@@ -3440,7 +3214,23 @@
           <a:p>
             <a:r>
               <a:rPr lang="en-US" dirty="0" smtClean="0"/>
-              <a:t>Python and Plotting/Graphing</a:t>
+              <a:t>Local </a:t>
+            </a:r>
+            <a:r>
+              <a:rPr lang="en-US" dirty="0"/>
+              <a:t>and Remote </a:t>
+            </a:r>
+            <a:r>
+              <a:rPr lang="en-US" dirty="0" err="1"/>
+              <a:t>Git</a:t>
+            </a:r>
+            <a:r>
+              <a:rPr lang="en-US" dirty="0"/>
+              <a:t> </a:t>
+            </a:r>
+            <a:r>
+              <a:rPr lang="en-US" dirty="0" smtClean="0"/>
+              <a:t>Repository Setup</a:t>
             </a:r>
             <a:endParaRPr lang="en-US" dirty="0"/>
           </a:p>
@@ -3458,8 +3248,440 @@
         </p:nvSpPr>
         <p:spPr>
           <a:xfrm>
-            <a:off x="838200" y="1376039"/>
-            <a:ext cx="10515600" cy="4800924"/>
+            <a:off x="602672" y="1311170"/>
+            <a:ext cx="10986656" cy="4819466"/>
+          </a:xfrm>
+        </p:spPr>
+        <p:txBody>
+          <a:bodyPr>
+            <a:normAutofit lnSpcReduction="10000"/>
+          </a:bodyPr>
+          <a:lstStyle/>
+          <a:p>
+            <a:pPr marL="457200" indent="-457200">
+              <a:lnSpc>
+                <a:spcPct val="120000"/>
+              </a:lnSpc>
+              <a:buFont typeface="+mj-lt"/>
+              <a:buAutoNum type="arabicPeriod"/>
+            </a:pPr>
+            <a:r>
+              <a:rPr lang="en-US" sz="2400" dirty="0" smtClean="0"/>
+              <a:t>On Windows, open a </a:t>
+            </a:r>
+            <a:r>
+              <a:rPr lang="en-US" sz="2400" dirty="0" err="1" smtClean="0"/>
+              <a:t>cmd</a:t>
+            </a:r>
+            <a:r>
+              <a:rPr lang="en-US" sz="2400" dirty="0" smtClean="0"/>
+              <a:t> prompt window, change directories to the folder </a:t>
+            </a:r>
+            <a:r>
+              <a:rPr lang="en-US" sz="2400" dirty="0" smtClean="0"/>
+              <a:t>‘</a:t>
+            </a:r>
+            <a:r>
+              <a:rPr lang="en-US" sz="2400" dirty="0" err="1" smtClean="0"/>
+              <a:t>PythonLab</a:t>
+            </a:r>
+            <a:r>
+              <a:rPr lang="en-US" sz="2400" dirty="0" smtClean="0"/>
+              <a:t>’ </a:t>
+            </a:r>
+            <a:r>
+              <a:rPr lang="en-US" sz="2400" dirty="0" smtClean="0"/>
+              <a:t>you just created</a:t>
+            </a:r>
+            <a:endParaRPr lang="en-US" sz="2400" dirty="0"/>
+          </a:p>
+          <a:p>
+            <a:pPr marL="457200" indent="-457200">
+              <a:lnSpc>
+                <a:spcPct val="120000"/>
+              </a:lnSpc>
+              <a:buFont typeface="+mj-lt"/>
+              <a:buAutoNum type="arabicPeriod"/>
+            </a:pPr>
+            <a:endParaRPr lang="en-US" sz="2400" dirty="0" smtClean="0"/>
+          </a:p>
+          <a:p>
+            <a:pPr marL="457200" indent="-457200">
+              <a:lnSpc>
+                <a:spcPct val="120000"/>
+              </a:lnSpc>
+              <a:buFont typeface="+mj-lt"/>
+              <a:buAutoNum type="arabicPeriod"/>
+            </a:pPr>
+            <a:r>
+              <a:rPr lang="en-US" sz="2400" dirty="0" smtClean="0"/>
+              <a:t>Type </a:t>
+            </a:r>
+            <a:r>
+              <a:rPr lang="en-US" sz="2400" b="1" dirty="0" err="1" smtClean="0">
+                <a:solidFill>
+                  <a:srgbClr val="FF0000"/>
+                </a:solidFill>
+              </a:rPr>
+              <a:t>git</a:t>
+            </a:r>
+            <a:r>
+              <a:rPr lang="en-US" sz="2400" b="1" dirty="0" smtClean="0">
+                <a:solidFill>
+                  <a:srgbClr val="FF0000"/>
+                </a:solidFill>
+              </a:rPr>
+              <a:t> </a:t>
+            </a:r>
+            <a:r>
+              <a:rPr lang="en-US" sz="2400" b="1" dirty="0" err="1" smtClean="0">
+                <a:solidFill>
+                  <a:srgbClr val="FF0000"/>
+                </a:solidFill>
+              </a:rPr>
+              <a:t>init</a:t>
+            </a:r>
+            <a:r>
+              <a:rPr lang="en-US" sz="2400" dirty="0" smtClean="0">
+                <a:solidFill>
+                  <a:srgbClr val="FF0000"/>
+                </a:solidFill>
+              </a:rPr>
+              <a:t> </a:t>
+            </a:r>
+            <a:r>
+              <a:rPr lang="en-US" sz="2400" dirty="0" smtClean="0"/>
+              <a:t>to create local </a:t>
+            </a:r>
+            <a:r>
+              <a:rPr lang="en-US" sz="2400" dirty="0" err="1" smtClean="0"/>
+              <a:t>git</a:t>
+            </a:r>
+            <a:r>
+              <a:rPr lang="en-US" sz="2400" dirty="0" smtClean="0"/>
+              <a:t> repo</a:t>
+            </a:r>
+          </a:p>
+          <a:p>
+            <a:pPr marL="457200" indent="-457200">
+              <a:buFont typeface="+mj-lt"/>
+              <a:buAutoNum type="arabicPeriod"/>
+            </a:pPr>
+            <a:r>
+              <a:rPr lang="en-US" sz="2400" dirty="0" smtClean="0"/>
+              <a:t>Type </a:t>
+            </a:r>
+            <a:r>
+              <a:rPr lang="en-US" sz="2400" b="1" dirty="0" err="1" smtClean="0">
+                <a:solidFill>
+                  <a:srgbClr val="FF0000"/>
+                </a:solidFill>
+              </a:rPr>
+              <a:t>git</a:t>
+            </a:r>
+            <a:r>
+              <a:rPr lang="en-US" sz="2400" b="1" dirty="0" smtClean="0">
+                <a:solidFill>
+                  <a:srgbClr val="FF0000"/>
+                </a:solidFill>
+              </a:rPr>
+              <a:t> remote add origin &lt;your </a:t>
+            </a:r>
+            <a:r>
+              <a:rPr lang="en-US" sz="2400" b="1" dirty="0" err="1" smtClean="0">
+                <a:solidFill>
+                  <a:srgbClr val="FF0000"/>
+                </a:solidFill>
+              </a:rPr>
+              <a:t>github</a:t>
+            </a:r>
+            <a:r>
+              <a:rPr lang="en-US" sz="2400" b="1" dirty="0" smtClean="0">
+                <a:solidFill>
+                  <a:srgbClr val="FF0000"/>
+                </a:solidFill>
+              </a:rPr>
+              <a:t> repo </a:t>
+            </a:r>
+            <a:r>
+              <a:rPr lang="en-US" sz="2400" b="1" dirty="0" err="1" smtClean="0">
+                <a:solidFill>
+                  <a:srgbClr val="FF0000"/>
+                </a:solidFill>
+              </a:rPr>
+              <a:t>url</a:t>
+            </a:r>
+            <a:r>
+              <a:rPr lang="en-US" sz="2400" b="1" dirty="0" smtClean="0">
+                <a:solidFill>
+                  <a:srgbClr val="FF0000"/>
+                </a:solidFill>
+              </a:rPr>
+              <a:t>&gt;</a:t>
+            </a:r>
+          </a:p>
+          <a:p>
+            <a:pPr marL="457200" indent="-457200">
+              <a:buFont typeface="+mj-lt"/>
+              <a:buAutoNum type="arabicPeriod"/>
+            </a:pPr>
+            <a:r>
+              <a:rPr lang="en-US" sz="2400" dirty="0" smtClean="0"/>
+              <a:t>Type </a:t>
+            </a:r>
+            <a:r>
+              <a:rPr lang="en-US" sz="2400" b="1" dirty="0" err="1" smtClean="0">
+                <a:solidFill>
+                  <a:srgbClr val="FF0000"/>
+                </a:solidFill>
+              </a:rPr>
+              <a:t>git</a:t>
+            </a:r>
+            <a:r>
+              <a:rPr lang="en-US" sz="2400" b="1" dirty="0" smtClean="0">
+                <a:solidFill>
+                  <a:srgbClr val="FF0000"/>
+                </a:solidFill>
+              </a:rPr>
+              <a:t> pull origin master</a:t>
+            </a:r>
+          </a:p>
+          <a:p>
+            <a:pPr marL="457200" indent="-457200">
+              <a:buFont typeface="+mj-lt"/>
+              <a:buAutoNum type="arabicPeriod"/>
+            </a:pPr>
+            <a:r>
+              <a:rPr lang="en-US" sz="2400" dirty="0" smtClean="0"/>
+              <a:t>Type </a:t>
+            </a:r>
+            <a:r>
+              <a:rPr lang="en-US" sz="2400" b="1" dirty="0" err="1" smtClean="0">
+                <a:solidFill>
+                  <a:srgbClr val="FF0000"/>
+                </a:solidFill>
+              </a:rPr>
+              <a:t>git</a:t>
+            </a:r>
+            <a:r>
+              <a:rPr lang="en-US" sz="2400" b="1" dirty="0" smtClean="0">
+                <a:solidFill>
+                  <a:srgbClr val="FF0000"/>
+                </a:solidFill>
+              </a:rPr>
+              <a:t> add . </a:t>
+            </a:r>
+            <a:r>
+              <a:rPr lang="en-US" sz="2400" dirty="0" smtClean="0"/>
+              <a:t>to add all files in the current directory to the local repo</a:t>
+            </a:r>
+          </a:p>
+          <a:p>
+            <a:pPr marL="457200" indent="-457200">
+              <a:buFont typeface="+mj-lt"/>
+              <a:buAutoNum type="arabicPeriod"/>
+            </a:pPr>
+            <a:r>
+              <a:rPr lang="en-US" sz="2400" dirty="0" smtClean="0"/>
+              <a:t>Type </a:t>
+            </a:r>
+            <a:r>
+              <a:rPr lang="en-US" sz="2400" b="1" dirty="0" err="1" smtClean="0">
+                <a:solidFill>
+                  <a:srgbClr val="FF0000"/>
+                </a:solidFill>
+              </a:rPr>
+              <a:t>git</a:t>
+            </a:r>
+            <a:r>
+              <a:rPr lang="en-US" sz="2400" b="1" dirty="0" smtClean="0">
+                <a:solidFill>
+                  <a:srgbClr val="FF0000"/>
+                </a:solidFill>
+              </a:rPr>
+              <a:t> commit </a:t>
+            </a:r>
+            <a:r>
+              <a:rPr lang="en-US" sz="2400" dirty="0" smtClean="0"/>
+              <a:t>and enter a commit message</a:t>
+            </a:r>
+          </a:p>
+          <a:p>
+            <a:pPr marL="457200" indent="-457200">
+              <a:buFont typeface="+mj-lt"/>
+              <a:buAutoNum type="arabicPeriod"/>
+            </a:pPr>
+            <a:r>
+              <a:rPr lang="en-US" sz="2400" dirty="0" smtClean="0"/>
+              <a:t>Type </a:t>
+            </a:r>
+            <a:r>
+              <a:rPr lang="en-US" sz="2400" b="1" dirty="0" err="1" smtClean="0">
+                <a:solidFill>
+                  <a:srgbClr val="FF0000"/>
+                </a:solidFill>
+              </a:rPr>
+              <a:t>git</a:t>
+            </a:r>
+            <a:r>
+              <a:rPr lang="en-US" sz="2400" b="1" dirty="0" smtClean="0">
+                <a:solidFill>
+                  <a:srgbClr val="FF0000"/>
+                </a:solidFill>
+              </a:rPr>
+              <a:t> push –u origin master </a:t>
+            </a:r>
+            <a:r>
+              <a:rPr lang="en-US" sz="2400" dirty="0" smtClean="0"/>
+              <a:t>to push your files to your </a:t>
+            </a:r>
+            <a:r>
+              <a:rPr lang="en-US" sz="2400" dirty="0" err="1" smtClean="0"/>
+              <a:t>Github</a:t>
+            </a:r>
+            <a:r>
+              <a:rPr lang="en-US" sz="2400" dirty="0" smtClean="0"/>
+              <a:t> remote repo</a:t>
+            </a:r>
+          </a:p>
+          <a:p>
+            <a:pPr marL="457200" indent="-457200">
+              <a:buFont typeface="+mj-lt"/>
+              <a:buAutoNum type="arabicPeriod"/>
+            </a:pPr>
+            <a:r>
+              <a:rPr lang="en-US" sz="2400" dirty="0" smtClean="0"/>
+              <a:t>Any changes to files in this folder can be pushed to the remote repo by repeating </a:t>
+            </a:r>
+            <a:r>
+              <a:rPr lang="en-US" sz="2400" smtClean="0"/>
+              <a:t>steps </a:t>
+            </a:r>
+            <a:r>
+              <a:rPr lang="en-US" sz="2400" b="1" smtClean="0">
+                <a:solidFill>
+                  <a:srgbClr val="FF0000"/>
+                </a:solidFill>
+              </a:rPr>
+              <a:t>5</a:t>
+            </a:r>
+            <a:r>
+              <a:rPr lang="en-US" sz="2400" b="1" smtClean="0">
+                <a:solidFill>
+                  <a:srgbClr val="FF0000"/>
+                </a:solidFill>
+              </a:rPr>
+              <a:t>-7</a:t>
+            </a:r>
+            <a:endParaRPr lang="en-US" sz="2400" b="1" dirty="0" smtClean="0">
+              <a:solidFill>
+                <a:srgbClr val="FF0000"/>
+              </a:solidFill>
+            </a:endParaRPr>
+          </a:p>
+          <a:p>
+            <a:pPr marL="457200" indent="-457200">
+              <a:buFont typeface="+mj-lt"/>
+              <a:buAutoNum type="arabicPeriod"/>
+            </a:pPr>
+            <a:endParaRPr lang="en-US" sz="2400" dirty="0" smtClean="0"/>
+          </a:p>
+          <a:p>
+            <a:endParaRPr lang="en-US" sz="2400" dirty="0"/>
+          </a:p>
+        </p:txBody>
+      </p:sp>
+      <p:pic>
+        <p:nvPicPr>
+          <p:cNvPr id="5" name="Picture 4"/>
+          <p:cNvPicPr>
+            <a:picLocks noChangeAspect="1"/>
+          </p:cNvPicPr>
+          <p:nvPr/>
+        </p:nvPicPr>
+        <p:blipFill>
+          <a:blip r:embed="rId2"/>
+          <a:stretch>
+            <a:fillRect/>
+          </a:stretch>
+        </p:blipFill>
+        <p:spPr>
+          <a:xfrm>
+            <a:off x="1152059" y="2260566"/>
+            <a:ext cx="6127348" cy="376167"/>
+          </a:xfrm>
+          <a:prstGeom prst="rect">
+            <a:avLst/>
+          </a:prstGeom>
+        </p:spPr>
+      </p:pic>
+    </p:spTree>
+    <p:extLst>
+      <p:ext uri="{BB962C8B-B14F-4D97-AF65-F5344CB8AC3E}">
+        <p14:creationId xmlns:p14="http://schemas.microsoft.com/office/powerpoint/2010/main" val="2747409329"/>
+      </p:ext>
+    </p:extLst>
+  </p:cSld>
+  <p:clrMapOvr>
+    <a:masterClrMapping/>
+  </p:clrMapOvr>
+</p:sld>
+</file>
+
+<file path=ppt/slides/slide3.xml><?xml version="1.0" encoding="utf-8"?>
+<p:sld xmlns:a="http://schemas.openxmlformats.org/drawingml/2006/main" xmlns:r="http://schemas.openxmlformats.org/officeDocument/2006/relationships" xmlns:p="http://schemas.openxmlformats.org/presentationml/2006/main">
+  <p:cSld>
+    <p:spTree>
+      <p:nvGrpSpPr>
+        <p:cNvPr id="1" name=""/>
+        <p:cNvGrpSpPr/>
+        <p:nvPr/>
+      </p:nvGrpSpPr>
+      <p:grpSpPr>
+        <a:xfrm>
+          <a:off x="0" y="0"/>
+          <a:ext cx="0" cy="0"/>
+          <a:chOff x="0" y="0"/>
+          <a:chExt cx="0" cy="0"/>
+        </a:xfrm>
+      </p:grpSpPr>
+      <p:sp>
+        <p:nvSpPr>
+          <p:cNvPr id="2" name="Title 1"/>
+          <p:cNvSpPr>
+            <a:spLocks noGrp="1"/>
+          </p:cNvSpPr>
+          <p:nvPr>
+            <p:ph type="title"/>
+          </p:nvPr>
+        </p:nvSpPr>
+        <p:spPr/>
+        <p:txBody>
+          <a:bodyPr/>
+          <a:lstStyle/>
+          <a:p>
+            <a:r>
+              <a:rPr lang="en-US" dirty="0" smtClean="0"/>
+              <a:t>Python and Plotting/Graphing</a:t>
+            </a:r>
+            <a:endParaRPr lang="en-US" dirty="0"/>
+          </a:p>
+        </p:txBody>
+      </p:sp>
+      <p:sp>
+        <p:nvSpPr>
+          <p:cNvPr id="3" name="Content Placeholder 2"/>
+          <p:cNvSpPr>
+            <a:spLocks noGrp="1"/>
+          </p:cNvSpPr>
+          <p:nvPr>
+            <p:ph idx="1"/>
+          </p:nvPr>
+        </p:nvSpPr>
+        <p:spPr>
+          <a:xfrm>
+            <a:off x="838200" y="1376038"/>
+            <a:ext cx="10515600" cy="5140349"/>
           </a:xfrm>
         </p:spPr>
         <p:txBody>
@@ -3576,7 +3798,7 @@
 </p:sld>
 </file>
 
-<file path=ppt/slides/slide3.xml><?xml version="1.0" encoding="utf-8"?>
+<file path=ppt/slides/slide4.xml><?xml version="1.0" encoding="utf-8"?>
 <p:sld xmlns:a="http://schemas.openxmlformats.org/drawingml/2006/main" xmlns:r="http://schemas.openxmlformats.org/officeDocument/2006/relationships" xmlns:p="http://schemas.openxmlformats.org/presentationml/2006/main">
   <p:cSld>
     <p:spTree>
@@ -3770,84 +3992,6 @@
 </p:sld>
 </file>
 
-<file path=ppt/slides/slide4.xml><?xml version="1.0" encoding="utf-8"?>
-<p:sld xmlns:a="http://schemas.openxmlformats.org/drawingml/2006/main" xmlns:r="http://schemas.openxmlformats.org/officeDocument/2006/relationships" xmlns:p="http://schemas.openxmlformats.org/presentationml/2006/main">
-  <p:cSld>
-    <p:spTree>
-      <p:nvGrpSpPr>
-        <p:cNvPr id="1" name=""/>
-        <p:cNvGrpSpPr/>
-        <p:nvPr/>
-      </p:nvGrpSpPr>
-      <p:grpSpPr>
-        <a:xfrm>
-          <a:off x="0" y="0"/>
-          <a:ext cx="0" cy="0"/>
-          <a:chOff x="0" y="0"/>
-          <a:chExt cx="0" cy="0"/>
-        </a:xfrm>
-      </p:grpSpPr>
-      <p:sp>
-        <p:nvSpPr>
-          <p:cNvPr id="2" name="Title 1"/>
-          <p:cNvSpPr>
-            <a:spLocks noGrp="1"/>
-          </p:cNvSpPr>
-          <p:nvPr>
-            <p:ph type="title"/>
-          </p:nvPr>
-        </p:nvSpPr>
-        <p:spPr/>
-        <p:txBody>
-          <a:bodyPr/>
-          <a:lstStyle/>
-          <a:p>
-            <a:r>
-              <a:rPr lang="en-US" dirty="0"/>
-              <a:t>Python and Plotting/Graphing</a:t>
-            </a:r>
-          </a:p>
-        </p:txBody>
-      </p:sp>
-      <p:pic>
-        <p:nvPicPr>
-          <p:cNvPr id="4" name="Content Placeholder 3"/>
-          <p:cNvPicPr>
-            <a:picLocks noGrp="1" noChangeAspect="1"/>
-          </p:cNvPicPr>
-          <p:nvPr>
-            <p:ph idx="1"/>
-          </p:nvPr>
-        </p:nvPicPr>
-        <p:blipFill>
-          <a:blip r:embed="rId2"/>
-          <a:stretch>
-            <a:fillRect/>
-          </a:stretch>
-        </p:blipFill>
-        <p:spPr>
-          <a:xfrm>
-            <a:off x="1814512" y="1824831"/>
-            <a:ext cx="8562975" cy="3714750"/>
-          </a:xfrm>
-          <a:prstGeom prst="rect">
-            <a:avLst/>
-          </a:prstGeom>
-        </p:spPr>
-      </p:pic>
-    </p:spTree>
-    <p:extLst>
-      <p:ext uri="{BB962C8B-B14F-4D97-AF65-F5344CB8AC3E}">
-        <p14:creationId xmlns:p14="http://schemas.microsoft.com/office/powerpoint/2010/main" val="1401507691"/>
-      </p:ext>
-    </p:extLst>
-  </p:cSld>
-  <p:clrMapOvr>
-    <a:masterClrMapping/>
-  </p:clrMapOvr>
-</p:sld>
-</file>
-
 <file path=ppt/slides/slide5.xml><?xml version="1.0" encoding="utf-8"?>
 <p:sld xmlns:a="http://schemas.openxmlformats.org/drawingml/2006/main" xmlns:r="http://schemas.openxmlformats.org/officeDocument/2006/relationships" xmlns:p="http://schemas.openxmlformats.org/presentationml/2006/main">
   <p:cSld>
@@ -3887,6 +4031,278 @@
           </a:p>
         </p:txBody>
       </p:sp>
+      <p:pic>
+        <p:nvPicPr>
+          <p:cNvPr id="4" name="Content Placeholder 3"/>
+          <p:cNvPicPr>
+            <a:picLocks noGrp="1" noChangeAspect="1"/>
+          </p:cNvPicPr>
+          <p:nvPr>
+            <p:ph idx="1"/>
+          </p:nvPr>
+        </p:nvPicPr>
+        <p:blipFill>
+          <a:blip r:embed="rId2"/>
+          <a:stretch>
+            <a:fillRect/>
+          </a:stretch>
+        </p:blipFill>
+        <p:spPr>
+          <a:xfrm>
+            <a:off x="957985" y="1506527"/>
+            <a:ext cx="8562975" cy="3714750"/>
+          </a:xfrm>
+          <a:prstGeom prst="rect">
+            <a:avLst/>
+          </a:prstGeom>
+        </p:spPr>
+      </p:pic>
+      <p:sp>
+        <p:nvSpPr>
+          <p:cNvPr id="5" name="Content Placeholder 2"/>
+          <p:cNvSpPr txBox="1">
+            <a:spLocks/>
+          </p:cNvSpPr>
+          <p:nvPr/>
+        </p:nvSpPr>
+        <p:spPr>
+          <a:xfrm>
+            <a:off x="838200" y="5330142"/>
+            <a:ext cx="10515600" cy="1082233"/>
+          </a:xfrm>
+          <a:prstGeom prst="rect">
+            <a:avLst/>
+          </a:prstGeom>
+        </p:spPr>
+        <p:txBody>
+          <a:bodyPr vert="horz" lIns="91440" tIns="45720" rIns="91440" bIns="45720" rtlCol="0">
+            <a:noAutofit/>
+          </a:bodyPr>
+          <a:lstStyle>
+            <a:lvl1pPr marL="228600" indent="-228600" algn="l" defTabSz="914400" rtl="0" eaLnBrk="1" latinLnBrk="0" hangingPunct="1">
+              <a:lnSpc>
+                <a:spcPct val="90000"/>
+              </a:lnSpc>
+              <a:spcBef>
+                <a:spcPts val="1000"/>
+              </a:spcBef>
+              <a:buFont typeface="Arial" panose="020B0604020202020204" pitchFamily="34" charset="0"/>
+              <a:buChar char="•"/>
+              <a:defRPr sz="2800" kern="1200">
+                <a:solidFill>
+                  <a:schemeClr val="tx1"/>
+                </a:solidFill>
+                <a:latin typeface="+mn-lt"/>
+                <a:ea typeface="+mn-ea"/>
+                <a:cs typeface="+mn-cs"/>
+              </a:defRPr>
+            </a:lvl1pPr>
+            <a:lvl2pPr marL="685800" indent="-228600" algn="l" defTabSz="914400" rtl="0" eaLnBrk="1" latinLnBrk="0" hangingPunct="1">
+              <a:lnSpc>
+                <a:spcPct val="90000"/>
+              </a:lnSpc>
+              <a:spcBef>
+                <a:spcPts val="500"/>
+              </a:spcBef>
+              <a:buFont typeface="Arial" panose="020B0604020202020204" pitchFamily="34" charset="0"/>
+              <a:buChar char="•"/>
+              <a:defRPr sz="2400" kern="1200">
+                <a:solidFill>
+                  <a:schemeClr val="tx1"/>
+                </a:solidFill>
+                <a:latin typeface="+mn-lt"/>
+                <a:ea typeface="+mn-ea"/>
+                <a:cs typeface="+mn-cs"/>
+              </a:defRPr>
+            </a:lvl2pPr>
+            <a:lvl3pPr marL="1143000" indent="-228600" algn="l" defTabSz="914400" rtl="0" eaLnBrk="1" latinLnBrk="0" hangingPunct="1">
+              <a:lnSpc>
+                <a:spcPct val="90000"/>
+              </a:lnSpc>
+              <a:spcBef>
+                <a:spcPts val="500"/>
+              </a:spcBef>
+              <a:buFont typeface="Arial" panose="020B0604020202020204" pitchFamily="34" charset="0"/>
+              <a:buChar char="•"/>
+              <a:defRPr sz="2000" kern="1200">
+                <a:solidFill>
+                  <a:schemeClr val="tx1"/>
+                </a:solidFill>
+                <a:latin typeface="+mn-lt"/>
+                <a:ea typeface="+mn-ea"/>
+                <a:cs typeface="+mn-cs"/>
+              </a:defRPr>
+            </a:lvl3pPr>
+            <a:lvl4pPr marL="1600200" indent="-228600" algn="l" defTabSz="914400" rtl="0" eaLnBrk="1" latinLnBrk="0" hangingPunct="1">
+              <a:lnSpc>
+                <a:spcPct val="90000"/>
+              </a:lnSpc>
+              <a:spcBef>
+                <a:spcPts val="500"/>
+              </a:spcBef>
+              <a:buFont typeface="Arial" panose="020B0604020202020204" pitchFamily="34" charset="0"/>
+              <a:buChar char="•"/>
+              <a:defRPr sz="1800" kern="1200">
+                <a:solidFill>
+                  <a:schemeClr val="tx1"/>
+                </a:solidFill>
+                <a:latin typeface="+mn-lt"/>
+                <a:ea typeface="+mn-ea"/>
+                <a:cs typeface="+mn-cs"/>
+              </a:defRPr>
+            </a:lvl4pPr>
+            <a:lvl5pPr marL="2057400" indent="-228600" algn="l" defTabSz="914400" rtl="0" eaLnBrk="1" latinLnBrk="0" hangingPunct="1">
+              <a:lnSpc>
+                <a:spcPct val="90000"/>
+              </a:lnSpc>
+              <a:spcBef>
+                <a:spcPts val="500"/>
+              </a:spcBef>
+              <a:buFont typeface="Arial" panose="020B0604020202020204" pitchFamily="34" charset="0"/>
+              <a:buChar char="•"/>
+              <a:defRPr sz="1800" kern="1200">
+                <a:solidFill>
+                  <a:schemeClr val="tx1"/>
+                </a:solidFill>
+                <a:latin typeface="+mn-lt"/>
+                <a:ea typeface="+mn-ea"/>
+                <a:cs typeface="+mn-cs"/>
+              </a:defRPr>
+            </a:lvl5pPr>
+            <a:lvl6pPr marL="2514600" indent="-228600" algn="l" defTabSz="914400" rtl="0" eaLnBrk="1" latinLnBrk="0" hangingPunct="1">
+              <a:lnSpc>
+                <a:spcPct val="90000"/>
+              </a:lnSpc>
+              <a:spcBef>
+                <a:spcPts val="500"/>
+              </a:spcBef>
+              <a:buFont typeface="Arial" panose="020B0604020202020204" pitchFamily="34" charset="0"/>
+              <a:buChar char="•"/>
+              <a:defRPr sz="1800" kern="1200">
+                <a:solidFill>
+                  <a:schemeClr val="tx1"/>
+                </a:solidFill>
+                <a:latin typeface="+mn-lt"/>
+                <a:ea typeface="+mn-ea"/>
+                <a:cs typeface="+mn-cs"/>
+              </a:defRPr>
+            </a:lvl6pPr>
+            <a:lvl7pPr marL="2971800" indent="-228600" algn="l" defTabSz="914400" rtl="0" eaLnBrk="1" latinLnBrk="0" hangingPunct="1">
+              <a:lnSpc>
+                <a:spcPct val="90000"/>
+              </a:lnSpc>
+              <a:spcBef>
+                <a:spcPts val="500"/>
+              </a:spcBef>
+              <a:buFont typeface="Arial" panose="020B0604020202020204" pitchFamily="34" charset="0"/>
+              <a:buChar char="•"/>
+              <a:defRPr sz="1800" kern="1200">
+                <a:solidFill>
+                  <a:schemeClr val="tx1"/>
+                </a:solidFill>
+                <a:latin typeface="+mn-lt"/>
+                <a:ea typeface="+mn-ea"/>
+                <a:cs typeface="+mn-cs"/>
+              </a:defRPr>
+            </a:lvl7pPr>
+            <a:lvl8pPr marL="3429000" indent="-228600" algn="l" defTabSz="914400" rtl="0" eaLnBrk="1" latinLnBrk="0" hangingPunct="1">
+              <a:lnSpc>
+                <a:spcPct val="90000"/>
+              </a:lnSpc>
+              <a:spcBef>
+                <a:spcPts val="500"/>
+              </a:spcBef>
+              <a:buFont typeface="Arial" panose="020B0604020202020204" pitchFamily="34" charset="0"/>
+              <a:buChar char="•"/>
+              <a:defRPr sz="1800" kern="1200">
+                <a:solidFill>
+                  <a:schemeClr val="tx1"/>
+                </a:solidFill>
+                <a:latin typeface="+mn-lt"/>
+                <a:ea typeface="+mn-ea"/>
+                <a:cs typeface="+mn-cs"/>
+              </a:defRPr>
+            </a:lvl8pPr>
+            <a:lvl9pPr marL="3886200" indent="-228600" algn="l" defTabSz="914400" rtl="0" eaLnBrk="1" latinLnBrk="0" hangingPunct="1">
+              <a:lnSpc>
+                <a:spcPct val="90000"/>
+              </a:lnSpc>
+              <a:spcBef>
+                <a:spcPts val="500"/>
+              </a:spcBef>
+              <a:buFont typeface="Arial" panose="020B0604020202020204" pitchFamily="34" charset="0"/>
+              <a:buChar char="•"/>
+              <a:defRPr sz="1800" kern="1200">
+                <a:solidFill>
+                  <a:schemeClr val="tx1"/>
+                </a:solidFill>
+                <a:latin typeface="+mn-lt"/>
+                <a:ea typeface="+mn-ea"/>
+                <a:cs typeface="+mn-cs"/>
+              </a:defRPr>
+            </a:lvl9pPr>
+          </a:lstStyle>
+          <a:p>
+            <a:r>
+              <a:rPr lang="en-US" sz="2400" dirty="0" smtClean="0"/>
+              <a:t>Resample is a convenience method for resampling of a time series, and among the arguments, accepts one to indicate the periodicity – A being annual. A sum of submissions per year is calculated. </a:t>
+            </a:r>
+            <a:endParaRPr lang="en-US" sz="2400" dirty="0"/>
+          </a:p>
+        </p:txBody>
+      </p:sp>
+    </p:spTree>
+    <p:extLst>
+      <p:ext uri="{BB962C8B-B14F-4D97-AF65-F5344CB8AC3E}">
+        <p14:creationId xmlns:p14="http://schemas.microsoft.com/office/powerpoint/2010/main" val="1401507691"/>
+      </p:ext>
+    </p:extLst>
+  </p:cSld>
+  <p:clrMapOvr>
+    <a:masterClrMapping/>
+  </p:clrMapOvr>
+</p:sld>
+</file>
+
+<file path=ppt/slides/slide6.xml><?xml version="1.0" encoding="utf-8"?>
+<p:sld xmlns:a="http://schemas.openxmlformats.org/drawingml/2006/main" xmlns:r="http://schemas.openxmlformats.org/officeDocument/2006/relationships" xmlns:p="http://schemas.openxmlformats.org/presentationml/2006/main">
+  <p:cSld>
+    <p:spTree>
+      <p:nvGrpSpPr>
+        <p:cNvPr id="1" name=""/>
+        <p:cNvGrpSpPr/>
+        <p:nvPr/>
+      </p:nvGrpSpPr>
+      <p:grpSpPr>
+        <a:xfrm>
+          <a:off x="0" y="0"/>
+          <a:ext cx="0" cy="0"/>
+          <a:chOff x="0" y="0"/>
+          <a:chExt cx="0" cy="0"/>
+        </a:xfrm>
+      </p:grpSpPr>
+      <p:sp>
+        <p:nvSpPr>
+          <p:cNvPr id="2" name="Title 1"/>
+          <p:cNvSpPr>
+            <a:spLocks noGrp="1"/>
+          </p:cNvSpPr>
+          <p:nvPr>
+            <p:ph type="title"/>
+          </p:nvPr>
+        </p:nvSpPr>
+        <p:spPr/>
+        <p:txBody>
+          <a:bodyPr/>
+          <a:lstStyle/>
+          <a:p>
+            <a:r>
+              <a:rPr lang="en-US" dirty="0"/>
+              <a:t>Python and Plotting/Graphing</a:t>
+            </a:r>
+          </a:p>
+        </p:txBody>
+      </p:sp>
       <p:sp>
         <p:nvSpPr>
           <p:cNvPr id="3" name="Content Placeholder 2"/>
@@ -3929,7 +4345,7 @@
       </p:sp>
       <p:pic>
         <p:nvPicPr>
-          <p:cNvPr id="5" name="Picture 4"/>
+          <p:cNvPr id="4" name="Picture 3"/>
           <p:cNvPicPr>
             <a:picLocks noChangeAspect="1"/>
           </p:cNvPicPr>
@@ -3943,8 +4359,8 @@
         </p:blipFill>
         <p:spPr>
           <a:xfrm>
-            <a:off x="1164685" y="1933078"/>
-            <a:ext cx="7757374" cy="1407793"/>
+            <a:off x="1076557" y="1831014"/>
+            <a:ext cx="7532146" cy="1334631"/>
           </a:xfrm>
           <a:prstGeom prst="rect">
             <a:avLst/>
@@ -3988,7 +4404,7 @@
 </p:sld>
 </file>
 
-<file path=ppt/slides/slide6.xml><?xml version="1.0" encoding="utf-8"?>
+<file path=ppt/slides/slide7.xml><?xml version="1.0" encoding="utf-8"?>
 <p:sld xmlns:a="http://schemas.openxmlformats.org/drawingml/2006/main" xmlns:r="http://schemas.openxmlformats.org/officeDocument/2006/relationships" xmlns:p="http://schemas.openxmlformats.org/presentationml/2006/main">
   <p:cSld>
     <p:spTree>
@@ -4049,12 +4465,6 @@
           </a:bodyPr>
           <a:lstStyle/>
           <a:p>
-            <a:r>
-              <a:rPr lang="en-US" sz="2400" dirty="0" smtClean="0"/>
-              <a:t>Data Analysis: Add a new column containing calculated data Ex:</a:t>
-            </a:r>
-          </a:p>
-          <a:p>
             <a:endParaRPr lang="en-US" sz="2400" dirty="0" smtClean="0"/>
           </a:p>
           <a:p>
@@ -4064,7 +4474,7 @@
       </p:sp>
       <p:pic>
         <p:nvPicPr>
-          <p:cNvPr id="4" name="Picture 3"/>
+          <p:cNvPr id="6" name="Picture 5"/>
           <p:cNvPicPr>
             <a:picLocks noChangeAspect="1"/>
           </p:cNvPicPr>
@@ -4078,8 +4488,676 @@
         </p:blipFill>
         <p:spPr>
           <a:xfrm>
-            <a:off x="1174511" y="1948554"/>
-            <a:ext cx="8792545" cy="616399"/>
+            <a:off x="908292" y="1443885"/>
+            <a:ext cx="9842977" cy="1720495"/>
+          </a:xfrm>
+          <a:prstGeom prst="rect">
+            <a:avLst/>
+          </a:prstGeom>
+        </p:spPr>
+      </p:pic>
+      <p:pic>
+        <p:nvPicPr>
+          <p:cNvPr id="7" name="Picture 6"/>
+          <p:cNvPicPr>
+            <a:picLocks noChangeAspect="1"/>
+          </p:cNvPicPr>
+          <p:nvPr/>
+        </p:nvPicPr>
+        <p:blipFill>
+          <a:blip r:embed="rId3"/>
+          <a:stretch>
+            <a:fillRect/>
+          </a:stretch>
+        </p:blipFill>
+        <p:spPr>
+          <a:xfrm>
+            <a:off x="6612778" y="3093278"/>
+            <a:ext cx="4654885" cy="3041121"/>
+          </a:xfrm>
+          <a:prstGeom prst="rect">
+            <a:avLst/>
+          </a:prstGeom>
+        </p:spPr>
+      </p:pic>
+      <p:sp>
+        <p:nvSpPr>
+          <p:cNvPr id="8" name="Content Placeholder 2"/>
+          <p:cNvSpPr txBox="1">
+            <a:spLocks/>
+          </p:cNvSpPr>
+          <p:nvPr/>
+        </p:nvSpPr>
+        <p:spPr>
+          <a:xfrm>
+            <a:off x="794657" y="3531605"/>
+            <a:ext cx="5301343" cy="2033172"/>
+          </a:xfrm>
+          <a:prstGeom prst="rect">
+            <a:avLst/>
+          </a:prstGeom>
+        </p:spPr>
+        <p:txBody>
+          <a:bodyPr vert="horz" lIns="91440" tIns="45720" rIns="91440" bIns="45720" rtlCol="0">
+            <a:noAutofit/>
+          </a:bodyPr>
+          <a:lstStyle>
+            <a:lvl1pPr marL="228600" indent="-228600" algn="l" defTabSz="914400" rtl="0" eaLnBrk="1" latinLnBrk="0" hangingPunct="1">
+              <a:lnSpc>
+                <a:spcPct val="90000"/>
+              </a:lnSpc>
+              <a:spcBef>
+                <a:spcPts val="1000"/>
+              </a:spcBef>
+              <a:buFont typeface="Arial" panose="020B0604020202020204" pitchFamily="34" charset="0"/>
+              <a:buChar char="•"/>
+              <a:defRPr sz="2800" kern="1200">
+                <a:solidFill>
+                  <a:schemeClr val="tx1"/>
+                </a:solidFill>
+                <a:latin typeface="+mn-lt"/>
+                <a:ea typeface="+mn-ea"/>
+                <a:cs typeface="+mn-cs"/>
+              </a:defRPr>
+            </a:lvl1pPr>
+            <a:lvl2pPr marL="685800" indent="-228600" algn="l" defTabSz="914400" rtl="0" eaLnBrk="1" latinLnBrk="0" hangingPunct="1">
+              <a:lnSpc>
+                <a:spcPct val="90000"/>
+              </a:lnSpc>
+              <a:spcBef>
+                <a:spcPts val="500"/>
+              </a:spcBef>
+              <a:buFont typeface="Arial" panose="020B0604020202020204" pitchFamily="34" charset="0"/>
+              <a:buChar char="•"/>
+              <a:defRPr sz="2400" kern="1200">
+                <a:solidFill>
+                  <a:schemeClr val="tx1"/>
+                </a:solidFill>
+                <a:latin typeface="+mn-lt"/>
+                <a:ea typeface="+mn-ea"/>
+                <a:cs typeface="+mn-cs"/>
+              </a:defRPr>
+            </a:lvl2pPr>
+            <a:lvl3pPr marL="1143000" indent="-228600" algn="l" defTabSz="914400" rtl="0" eaLnBrk="1" latinLnBrk="0" hangingPunct="1">
+              <a:lnSpc>
+                <a:spcPct val="90000"/>
+              </a:lnSpc>
+              <a:spcBef>
+                <a:spcPts val="500"/>
+              </a:spcBef>
+              <a:buFont typeface="Arial" panose="020B0604020202020204" pitchFamily="34" charset="0"/>
+              <a:buChar char="•"/>
+              <a:defRPr sz="2000" kern="1200">
+                <a:solidFill>
+                  <a:schemeClr val="tx1"/>
+                </a:solidFill>
+                <a:latin typeface="+mn-lt"/>
+                <a:ea typeface="+mn-ea"/>
+                <a:cs typeface="+mn-cs"/>
+              </a:defRPr>
+            </a:lvl3pPr>
+            <a:lvl4pPr marL="1600200" indent="-228600" algn="l" defTabSz="914400" rtl="0" eaLnBrk="1" latinLnBrk="0" hangingPunct="1">
+              <a:lnSpc>
+                <a:spcPct val="90000"/>
+              </a:lnSpc>
+              <a:spcBef>
+                <a:spcPts val="500"/>
+              </a:spcBef>
+              <a:buFont typeface="Arial" panose="020B0604020202020204" pitchFamily="34" charset="0"/>
+              <a:buChar char="•"/>
+              <a:defRPr sz="1800" kern="1200">
+                <a:solidFill>
+                  <a:schemeClr val="tx1"/>
+                </a:solidFill>
+                <a:latin typeface="+mn-lt"/>
+                <a:ea typeface="+mn-ea"/>
+                <a:cs typeface="+mn-cs"/>
+              </a:defRPr>
+            </a:lvl4pPr>
+            <a:lvl5pPr marL="2057400" indent="-228600" algn="l" defTabSz="914400" rtl="0" eaLnBrk="1" latinLnBrk="0" hangingPunct="1">
+              <a:lnSpc>
+                <a:spcPct val="90000"/>
+              </a:lnSpc>
+              <a:spcBef>
+                <a:spcPts val="500"/>
+              </a:spcBef>
+              <a:buFont typeface="Arial" panose="020B0604020202020204" pitchFamily="34" charset="0"/>
+              <a:buChar char="•"/>
+              <a:defRPr sz="1800" kern="1200">
+                <a:solidFill>
+                  <a:schemeClr val="tx1"/>
+                </a:solidFill>
+                <a:latin typeface="+mn-lt"/>
+                <a:ea typeface="+mn-ea"/>
+                <a:cs typeface="+mn-cs"/>
+              </a:defRPr>
+            </a:lvl5pPr>
+            <a:lvl6pPr marL="2514600" indent="-228600" algn="l" defTabSz="914400" rtl="0" eaLnBrk="1" latinLnBrk="0" hangingPunct="1">
+              <a:lnSpc>
+                <a:spcPct val="90000"/>
+              </a:lnSpc>
+              <a:spcBef>
+                <a:spcPts val="500"/>
+              </a:spcBef>
+              <a:buFont typeface="Arial" panose="020B0604020202020204" pitchFamily="34" charset="0"/>
+              <a:buChar char="•"/>
+              <a:defRPr sz="1800" kern="1200">
+                <a:solidFill>
+                  <a:schemeClr val="tx1"/>
+                </a:solidFill>
+                <a:latin typeface="+mn-lt"/>
+                <a:ea typeface="+mn-ea"/>
+                <a:cs typeface="+mn-cs"/>
+              </a:defRPr>
+            </a:lvl6pPr>
+            <a:lvl7pPr marL="2971800" indent="-228600" algn="l" defTabSz="914400" rtl="0" eaLnBrk="1" latinLnBrk="0" hangingPunct="1">
+              <a:lnSpc>
+                <a:spcPct val="90000"/>
+              </a:lnSpc>
+              <a:spcBef>
+                <a:spcPts val="500"/>
+              </a:spcBef>
+              <a:buFont typeface="Arial" panose="020B0604020202020204" pitchFamily="34" charset="0"/>
+              <a:buChar char="•"/>
+              <a:defRPr sz="1800" kern="1200">
+                <a:solidFill>
+                  <a:schemeClr val="tx1"/>
+                </a:solidFill>
+                <a:latin typeface="+mn-lt"/>
+                <a:ea typeface="+mn-ea"/>
+                <a:cs typeface="+mn-cs"/>
+              </a:defRPr>
+            </a:lvl7pPr>
+            <a:lvl8pPr marL="3429000" indent="-228600" algn="l" defTabSz="914400" rtl="0" eaLnBrk="1" latinLnBrk="0" hangingPunct="1">
+              <a:lnSpc>
+                <a:spcPct val="90000"/>
+              </a:lnSpc>
+              <a:spcBef>
+                <a:spcPts val="500"/>
+              </a:spcBef>
+              <a:buFont typeface="Arial" panose="020B0604020202020204" pitchFamily="34" charset="0"/>
+              <a:buChar char="•"/>
+              <a:defRPr sz="1800" kern="1200">
+                <a:solidFill>
+                  <a:schemeClr val="tx1"/>
+                </a:solidFill>
+                <a:latin typeface="+mn-lt"/>
+                <a:ea typeface="+mn-ea"/>
+                <a:cs typeface="+mn-cs"/>
+              </a:defRPr>
+            </a:lvl8pPr>
+            <a:lvl9pPr marL="3886200" indent="-228600" algn="l" defTabSz="914400" rtl="0" eaLnBrk="1" latinLnBrk="0" hangingPunct="1">
+              <a:lnSpc>
+                <a:spcPct val="90000"/>
+              </a:lnSpc>
+              <a:spcBef>
+                <a:spcPts val="500"/>
+              </a:spcBef>
+              <a:buFont typeface="Arial" panose="020B0604020202020204" pitchFamily="34" charset="0"/>
+              <a:buChar char="•"/>
+              <a:defRPr sz="1800" kern="1200">
+                <a:solidFill>
+                  <a:schemeClr val="tx1"/>
+                </a:solidFill>
+                <a:latin typeface="+mn-lt"/>
+                <a:ea typeface="+mn-ea"/>
+                <a:cs typeface="+mn-cs"/>
+              </a:defRPr>
+            </a:lvl9pPr>
+          </a:lstStyle>
+          <a:p>
+            <a:r>
+              <a:rPr lang="en-US" sz="2400" dirty="0" smtClean="0"/>
+              <a:t>Binned data such as Age, is best represented using a Histogram. </a:t>
+            </a:r>
+            <a:r>
+              <a:rPr lang="en-US" sz="2400" dirty="0" err="1" smtClean="0"/>
+              <a:t>Matplotlib</a:t>
+            </a:r>
+            <a:r>
+              <a:rPr lang="en-US" sz="2400" dirty="0" smtClean="0"/>
+              <a:t> can be used to automatically bin continuous data and display the distribution using a Histogram.</a:t>
+            </a:r>
+            <a:endParaRPr lang="en-US" sz="2400" dirty="0"/>
+          </a:p>
+        </p:txBody>
+      </p:sp>
+    </p:spTree>
+    <p:extLst>
+      <p:ext uri="{BB962C8B-B14F-4D97-AF65-F5344CB8AC3E}">
+        <p14:creationId xmlns:p14="http://schemas.microsoft.com/office/powerpoint/2010/main" val="2825020176"/>
+      </p:ext>
+    </p:extLst>
+  </p:cSld>
+  <p:clrMapOvr>
+    <a:masterClrMapping/>
+  </p:clrMapOvr>
+</p:sld>
+</file>
+
+<file path=ppt/slides/slide8.xml><?xml version="1.0" encoding="utf-8"?>
+<p:sld xmlns:a="http://schemas.openxmlformats.org/drawingml/2006/main" xmlns:r="http://schemas.openxmlformats.org/officeDocument/2006/relationships" xmlns:p="http://schemas.openxmlformats.org/presentationml/2006/main">
+  <p:cSld>
+    <p:spTree>
+      <p:nvGrpSpPr>
+        <p:cNvPr id="1" name=""/>
+        <p:cNvGrpSpPr/>
+        <p:nvPr/>
+      </p:nvGrpSpPr>
+      <p:grpSpPr>
+        <a:xfrm>
+          <a:off x="0" y="0"/>
+          <a:ext cx="0" cy="0"/>
+          <a:chOff x="0" y="0"/>
+          <a:chExt cx="0" cy="0"/>
+        </a:xfrm>
+      </p:grpSpPr>
+      <p:sp>
+        <p:nvSpPr>
+          <p:cNvPr id="2" name="Title 1"/>
+          <p:cNvSpPr>
+            <a:spLocks noGrp="1"/>
+          </p:cNvSpPr>
+          <p:nvPr>
+            <p:ph type="title"/>
+          </p:nvPr>
+        </p:nvSpPr>
+        <p:spPr/>
+        <p:txBody>
+          <a:bodyPr/>
+          <a:lstStyle/>
+          <a:p>
+            <a:r>
+              <a:rPr lang="en-US" dirty="0"/>
+              <a:t>Python and Plotting/Graphing</a:t>
+            </a:r>
+          </a:p>
+        </p:txBody>
+      </p:sp>
+      <p:sp>
+        <p:nvSpPr>
+          <p:cNvPr id="3" name="Content Placeholder 2"/>
+          <p:cNvSpPr>
+            <a:spLocks noGrp="1"/>
+          </p:cNvSpPr>
+          <p:nvPr>
+            <p:ph idx="1"/>
+          </p:nvPr>
+        </p:nvSpPr>
+        <p:spPr>
+          <a:xfrm>
+            <a:off x="838200" y="1443885"/>
+            <a:ext cx="10515600" cy="4351338"/>
+          </a:xfrm>
+        </p:spPr>
+        <p:txBody>
+          <a:bodyPr>
+            <a:normAutofit/>
+          </a:bodyPr>
+          <a:lstStyle/>
+          <a:p>
+            <a:endParaRPr lang="en-US" sz="2400" dirty="0" smtClean="0"/>
+          </a:p>
+          <a:p>
+            <a:endParaRPr lang="en-US" sz="2400" dirty="0"/>
+          </a:p>
+        </p:txBody>
+      </p:sp>
+      <p:pic>
+        <p:nvPicPr>
+          <p:cNvPr id="5" name="Picture 4"/>
+          <p:cNvPicPr>
+            <a:picLocks noChangeAspect="1"/>
+          </p:cNvPicPr>
+          <p:nvPr/>
+        </p:nvPicPr>
+        <p:blipFill>
+          <a:blip r:embed="rId2"/>
+          <a:stretch>
+            <a:fillRect/>
+          </a:stretch>
+        </p:blipFill>
+        <p:spPr>
+          <a:xfrm>
+            <a:off x="838200" y="1316478"/>
+            <a:ext cx="8185225" cy="1855076"/>
+          </a:xfrm>
+          <a:prstGeom prst="rect">
+            <a:avLst/>
+          </a:prstGeom>
+        </p:spPr>
+      </p:pic>
+      <p:pic>
+        <p:nvPicPr>
+          <p:cNvPr id="4" name="Picture 3"/>
+          <p:cNvPicPr>
+            <a:picLocks noChangeAspect="1"/>
+          </p:cNvPicPr>
+          <p:nvPr/>
+        </p:nvPicPr>
+        <p:blipFill>
+          <a:blip r:embed="rId3"/>
+          <a:stretch>
+            <a:fillRect/>
+          </a:stretch>
+        </p:blipFill>
+        <p:spPr>
+          <a:xfrm>
+            <a:off x="5697603" y="2642040"/>
+            <a:ext cx="6241847" cy="3875933"/>
+          </a:xfrm>
+          <a:prstGeom prst="rect">
+            <a:avLst/>
+          </a:prstGeom>
+        </p:spPr>
+      </p:pic>
+      <p:sp>
+        <p:nvSpPr>
+          <p:cNvPr id="8" name="Content Placeholder 2"/>
+          <p:cNvSpPr txBox="1">
+            <a:spLocks/>
+          </p:cNvSpPr>
+          <p:nvPr/>
+        </p:nvSpPr>
+        <p:spPr>
+          <a:xfrm>
+            <a:off x="396260" y="3436013"/>
+            <a:ext cx="5301343" cy="2359210"/>
+          </a:xfrm>
+          <a:prstGeom prst="rect">
+            <a:avLst/>
+          </a:prstGeom>
+        </p:spPr>
+        <p:txBody>
+          <a:bodyPr vert="horz" lIns="91440" tIns="45720" rIns="91440" bIns="45720" rtlCol="0">
+            <a:noAutofit/>
+          </a:bodyPr>
+          <a:lstStyle>
+            <a:lvl1pPr marL="228600" indent="-228600" algn="l" defTabSz="914400" rtl="0" eaLnBrk="1" latinLnBrk="0" hangingPunct="1">
+              <a:lnSpc>
+                <a:spcPct val="90000"/>
+              </a:lnSpc>
+              <a:spcBef>
+                <a:spcPts val="1000"/>
+              </a:spcBef>
+              <a:buFont typeface="Arial" panose="020B0604020202020204" pitchFamily="34" charset="0"/>
+              <a:buChar char="•"/>
+              <a:defRPr sz="2800" kern="1200">
+                <a:solidFill>
+                  <a:schemeClr val="tx1"/>
+                </a:solidFill>
+                <a:latin typeface="+mn-lt"/>
+                <a:ea typeface="+mn-ea"/>
+                <a:cs typeface="+mn-cs"/>
+              </a:defRPr>
+            </a:lvl1pPr>
+            <a:lvl2pPr marL="685800" indent="-228600" algn="l" defTabSz="914400" rtl="0" eaLnBrk="1" latinLnBrk="0" hangingPunct="1">
+              <a:lnSpc>
+                <a:spcPct val="90000"/>
+              </a:lnSpc>
+              <a:spcBef>
+                <a:spcPts val="500"/>
+              </a:spcBef>
+              <a:buFont typeface="Arial" panose="020B0604020202020204" pitchFamily="34" charset="0"/>
+              <a:buChar char="•"/>
+              <a:defRPr sz="2400" kern="1200">
+                <a:solidFill>
+                  <a:schemeClr val="tx1"/>
+                </a:solidFill>
+                <a:latin typeface="+mn-lt"/>
+                <a:ea typeface="+mn-ea"/>
+                <a:cs typeface="+mn-cs"/>
+              </a:defRPr>
+            </a:lvl2pPr>
+            <a:lvl3pPr marL="1143000" indent="-228600" algn="l" defTabSz="914400" rtl="0" eaLnBrk="1" latinLnBrk="0" hangingPunct="1">
+              <a:lnSpc>
+                <a:spcPct val="90000"/>
+              </a:lnSpc>
+              <a:spcBef>
+                <a:spcPts val="500"/>
+              </a:spcBef>
+              <a:buFont typeface="Arial" panose="020B0604020202020204" pitchFamily="34" charset="0"/>
+              <a:buChar char="•"/>
+              <a:defRPr sz="2000" kern="1200">
+                <a:solidFill>
+                  <a:schemeClr val="tx1"/>
+                </a:solidFill>
+                <a:latin typeface="+mn-lt"/>
+                <a:ea typeface="+mn-ea"/>
+                <a:cs typeface="+mn-cs"/>
+              </a:defRPr>
+            </a:lvl3pPr>
+            <a:lvl4pPr marL="1600200" indent="-228600" algn="l" defTabSz="914400" rtl="0" eaLnBrk="1" latinLnBrk="0" hangingPunct="1">
+              <a:lnSpc>
+                <a:spcPct val="90000"/>
+              </a:lnSpc>
+              <a:spcBef>
+                <a:spcPts val="500"/>
+              </a:spcBef>
+              <a:buFont typeface="Arial" panose="020B0604020202020204" pitchFamily="34" charset="0"/>
+              <a:buChar char="•"/>
+              <a:defRPr sz="1800" kern="1200">
+                <a:solidFill>
+                  <a:schemeClr val="tx1"/>
+                </a:solidFill>
+                <a:latin typeface="+mn-lt"/>
+                <a:ea typeface="+mn-ea"/>
+                <a:cs typeface="+mn-cs"/>
+              </a:defRPr>
+            </a:lvl4pPr>
+            <a:lvl5pPr marL="2057400" indent="-228600" algn="l" defTabSz="914400" rtl="0" eaLnBrk="1" latinLnBrk="0" hangingPunct="1">
+              <a:lnSpc>
+                <a:spcPct val="90000"/>
+              </a:lnSpc>
+              <a:spcBef>
+                <a:spcPts val="500"/>
+              </a:spcBef>
+              <a:buFont typeface="Arial" panose="020B0604020202020204" pitchFamily="34" charset="0"/>
+              <a:buChar char="•"/>
+              <a:defRPr sz="1800" kern="1200">
+                <a:solidFill>
+                  <a:schemeClr val="tx1"/>
+                </a:solidFill>
+                <a:latin typeface="+mn-lt"/>
+                <a:ea typeface="+mn-ea"/>
+                <a:cs typeface="+mn-cs"/>
+              </a:defRPr>
+            </a:lvl5pPr>
+            <a:lvl6pPr marL="2514600" indent="-228600" algn="l" defTabSz="914400" rtl="0" eaLnBrk="1" latinLnBrk="0" hangingPunct="1">
+              <a:lnSpc>
+                <a:spcPct val="90000"/>
+              </a:lnSpc>
+              <a:spcBef>
+                <a:spcPts val="500"/>
+              </a:spcBef>
+              <a:buFont typeface="Arial" panose="020B0604020202020204" pitchFamily="34" charset="0"/>
+              <a:buChar char="•"/>
+              <a:defRPr sz="1800" kern="1200">
+                <a:solidFill>
+                  <a:schemeClr val="tx1"/>
+                </a:solidFill>
+                <a:latin typeface="+mn-lt"/>
+                <a:ea typeface="+mn-ea"/>
+                <a:cs typeface="+mn-cs"/>
+              </a:defRPr>
+            </a:lvl6pPr>
+            <a:lvl7pPr marL="2971800" indent="-228600" algn="l" defTabSz="914400" rtl="0" eaLnBrk="1" latinLnBrk="0" hangingPunct="1">
+              <a:lnSpc>
+                <a:spcPct val="90000"/>
+              </a:lnSpc>
+              <a:spcBef>
+                <a:spcPts val="500"/>
+              </a:spcBef>
+              <a:buFont typeface="Arial" panose="020B0604020202020204" pitchFamily="34" charset="0"/>
+              <a:buChar char="•"/>
+              <a:defRPr sz="1800" kern="1200">
+                <a:solidFill>
+                  <a:schemeClr val="tx1"/>
+                </a:solidFill>
+                <a:latin typeface="+mn-lt"/>
+                <a:ea typeface="+mn-ea"/>
+                <a:cs typeface="+mn-cs"/>
+              </a:defRPr>
+            </a:lvl7pPr>
+            <a:lvl8pPr marL="3429000" indent="-228600" algn="l" defTabSz="914400" rtl="0" eaLnBrk="1" latinLnBrk="0" hangingPunct="1">
+              <a:lnSpc>
+                <a:spcPct val="90000"/>
+              </a:lnSpc>
+              <a:spcBef>
+                <a:spcPts val="500"/>
+              </a:spcBef>
+              <a:buFont typeface="Arial" panose="020B0604020202020204" pitchFamily="34" charset="0"/>
+              <a:buChar char="•"/>
+              <a:defRPr sz="1800" kern="1200">
+                <a:solidFill>
+                  <a:schemeClr val="tx1"/>
+                </a:solidFill>
+                <a:latin typeface="+mn-lt"/>
+                <a:ea typeface="+mn-ea"/>
+                <a:cs typeface="+mn-cs"/>
+              </a:defRPr>
+            </a:lvl8pPr>
+            <a:lvl9pPr marL="3886200" indent="-228600" algn="l" defTabSz="914400" rtl="0" eaLnBrk="1" latinLnBrk="0" hangingPunct="1">
+              <a:lnSpc>
+                <a:spcPct val="90000"/>
+              </a:lnSpc>
+              <a:spcBef>
+                <a:spcPts val="500"/>
+              </a:spcBef>
+              <a:buFont typeface="Arial" panose="020B0604020202020204" pitchFamily="34" charset="0"/>
+              <a:buChar char="•"/>
+              <a:defRPr sz="1800" kern="1200">
+                <a:solidFill>
+                  <a:schemeClr val="tx1"/>
+                </a:solidFill>
+                <a:latin typeface="+mn-lt"/>
+                <a:ea typeface="+mn-ea"/>
+                <a:cs typeface="+mn-cs"/>
+              </a:defRPr>
+            </a:lvl9pPr>
+          </a:lstStyle>
+          <a:p>
+            <a:r>
+              <a:rPr lang="en-US" sz="2400" dirty="0" smtClean="0"/>
+              <a:t>n is the number of items per bin</a:t>
+            </a:r>
+          </a:p>
+          <a:p>
+            <a:r>
+              <a:rPr lang="en-US" sz="2400" dirty="0" smtClean="0"/>
+              <a:t>bins is the left edge of each bin</a:t>
+            </a:r>
+          </a:p>
+          <a:p>
+            <a:r>
+              <a:rPr lang="en-US" sz="2400" dirty="0" smtClean="0"/>
+              <a:t>patches are the rectangles that are displayed on the histogram, and can be used to control their properties, such as color, border etc.</a:t>
+            </a:r>
+          </a:p>
+        </p:txBody>
+      </p:sp>
+    </p:spTree>
+    <p:extLst>
+      <p:ext uri="{BB962C8B-B14F-4D97-AF65-F5344CB8AC3E}">
+        <p14:creationId xmlns:p14="http://schemas.microsoft.com/office/powerpoint/2010/main" val="3558293533"/>
+      </p:ext>
+    </p:extLst>
+  </p:cSld>
+  <p:clrMapOvr>
+    <a:masterClrMapping/>
+  </p:clrMapOvr>
+</p:sld>
+</file>
+
+<file path=ppt/slides/slide9.xml><?xml version="1.0" encoding="utf-8"?>
+<p:sld xmlns:a="http://schemas.openxmlformats.org/drawingml/2006/main" xmlns:r="http://schemas.openxmlformats.org/officeDocument/2006/relationships" xmlns:p="http://schemas.openxmlformats.org/presentationml/2006/main">
+  <p:cSld>
+    <p:spTree>
+      <p:nvGrpSpPr>
+        <p:cNvPr id="1" name=""/>
+        <p:cNvGrpSpPr/>
+        <p:nvPr/>
+      </p:nvGrpSpPr>
+      <p:grpSpPr>
+        <a:xfrm>
+          <a:off x="0" y="0"/>
+          <a:ext cx="0" cy="0"/>
+          <a:chOff x="0" y="0"/>
+          <a:chExt cx="0" cy="0"/>
+        </a:xfrm>
+      </p:grpSpPr>
+      <p:sp>
+        <p:nvSpPr>
+          <p:cNvPr id="3" name="Content Placeholder 2"/>
+          <p:cNvSpPr>
+            <a:spLocks noGrp="1"/>
+          </p:cNvSpPr>
+          <p:nvPr>
+            <p:ph idx="1"/>
+          </p:nvPr>
+        </p:nvSpPr>
+        <p:spPr>
+          <a:xfrm>
+            <a:off x="838200" y="1410647"/>
+            <a:ext cx="10515600" cy="4351338"/>
+          </a:xfrm>
+        </p:spPr>
+        <p:txBody>
+          <a:bodyPr>
+            <a:normAutofit/>
+          </a:bodyPr>
+          <a:lstStyle/>
+          <a:p>
+            <a:r>
+              <a:rPr lang="en-US" sz="2400" dirty="0" smtClean="0"/>
+              <a:t>Compare Angina or its absence in admits with High Resting BP (&gt;120 mm Hg) vs. Normal Resting BP</a:t>
+            </a:r>
+          </a:p>
+          <a:p>
+            <a:endParaRPr lang="en-US" sz="2400" dirty="0"/>
+          </a:p>
+        </p:txBody>
+      </p:sp>
+      <p:sp>
+        <p:nvSpPr>
+          <p:cNvPr id="4" name="Title 1"/>
+          <p:cNvSpPr>
+            <a:spLocks noGrp="1"/>
+          </p:cNvSpPr>
+          <p:nvPr>
+            <p:ph type="title"/>
+          </p:nvPr>
+        </p:nvSpPr>
+        <p:spPr/>
+        <p:txBody>
+          <a:bodyPr/>
+          <a:lstStyle/>
+          <a:p>
+            <a:r>
+              <a:rPr lang="en-US" dirty="0"/>
+              <a:t>Python and Plotting/Graphing</a:t>
+            </a:r>
+          </a:p>
+        </p:txBody>
+      </p:sp>
+      <p:pic>
+        <p:nvPicPr>
+          <p:cNvPr id="5" name="Picture 4"/>
+          <p:cNvPicPr>
+            <a:picLocks noChangeAspect="1"/>
+          </p:cNvPicPr>
+          <p:nvPr/>
+        </p:nvPicPr>
+        <p:blipFill>
+          <a:blip r:embed="rId2"/>
+          <a:stretch>
+            <a:fillRect/>
+          </a:stretch>
+        </p:blipFill>
+        <p:spPr>
+          <a:xfrm>
+            <a:off x="992094" y="2102193"/>
+            <a:ext cx="7030290" cy="510675"/>
           </a:xfrm>
           <a:prstGeom prst="rect">
             <a:avLst/>
@@ -4102,32 +5180,8 @@
         </p:blipFill>
         <p:spPr>
           <a:xfrm>
-            <a:off x="1174511" y="2564953"/>
-            <a:ext cx="9842977" cy="1720495"/>
-          </a:xfrm>
-          <a:prstGeom prst="rect">
-            <a:avLst/>
-          </a:prstGeom>
-        </p:spPr>
-      </p:pic>
-      <p:pic>
-        <p:nvPicPr>
-          <p:cNvPr id="7" name="Picture 6"/>
-          <p:cNvPicPr>
-            <a:picLocks noChangeAspect="1"/>
-          </p:cNvPicPr>
-          <p:nvPr/>
-        </p:nvPicPr>
-        <p:blipFill>
-          <a:blip r:embed="rId4"/>
-          <a:stretch>
-            <a:fillRect/>
-          </a:stretch>
-        </p:blipFill>
-        <p:spPr>
-          <a:xfrm>
-            <a:off x="7382495" y="3538904"/>
-            <a:ext cx="4654885" cy="3041121"/>
+            <a:off x="992094" y="2602450"/>
+            <a:ext cx="9763050" cy="1123886"/>
           </a:xfrm>
           <a:prstGeom prst="rect">
             <a:avLst/>
@@ -4137,7 +5191,7 @@
     </p:spTree>
     <p:extLst>
       <p:ext uri="{BB962C8B-B14F-4D97-AF65-F5344CB8AC3E}">
-        <p14:creationId xmlns:p14="http://schemas.microsoft.com/office/powerpoint/2010/main" val="2825020176"/>
+        <p14:creationId xmlns:p14="http://schemas.microsoft.com/office/powerpoint/2010/main" val="2516130905"/>
       </p:ext>
     </p:extLst>
   </p:cSld>

</xml_diff>